<commit_message>
Updating Class 12 Bootstrap Info
</commit_message>
<xml_diff>
--- a/public/12/Day12_Lecture_Bootstrap-Intuition.pptx
+++ b/public/12/Day12_Lecture_Bootstrap-Intuition.pptx
@@ -218,7 +218,7 @@
           <a:p>
             <a:fld id="{A1E2E3C3-F7E9-4200-AD07-71CAFC79C3E0}" type="datetimeFigureOut">
               <a:rPr lang="en-US" smtClean="0"/>
-              <a:t>3/1/20</a:t>
+              <a:t>3/4/20</a:t>
             </a:fld>
             <a:endParaRPr lang="en-US"/>
           </a:p>
@@ -383,7 +383,7 @@
           <a:p>
             <a:fld id="{8C46B640-A0C3-4A26-921C-808E09F0570A}" type="datetimeFigureOut">
               <a:rPr lang="en-US" smtClean="0"/>
-              <a:t>3/1/20</a:t>
+              <a:t>3/4/20</a:t>
             </a:fld>
             <a:endParaRPr lang="en-US"/>
           </a:p>
@@ -1099,7 +1099,7 @@
           <a:p>
             <a:fld id="{C764DE79-268F-4C1A-8933-263129D2AF90}" type="datetimeFigureOut">
               <a:rPr lang="en-US" dirty="0"/>
-              <a:t>3/1/20</a:t>
+              <a:t>3/4/20</a:t>
             </a:fld>
             <a:endParaRPr lang="en-US" dirty="0"/>
           </a:p>
@@ -1264,7 +1264,7 @@
           <a:p>
             <a:fld id="{C764DE79-268F-4C1A-8933-263129D2AF90}" type="datetimeFigureOut">
               <a:rPr lang="en-US" dirty="0"/>
-              <a:t>3/1/20</a:t>
+              <a:t>3/4/20</a:t>
             </a:fld>
             <a:endParaRPr lang="en-US" dirty="0"/>
           </a:p>
@@ -1439,7 +1439,7 @@
           <a:p>
             <a:fld id="{C764DE79-268F-4C1A-8933-263129D2AF90}" type="datetimeFigureOut">
               <a:rPr lang="en-US" dirty="0"/>
-              <a:t>3/1/20</a:t>
+              <a:t>3/4/20</a:t>
             </a:fld>
             <a:endParaRPr lang="en-US" dirty="0"/>
           </a:p>
@@ -1787,7 +1787,7 @@
           <a:p>
             <a:fld id="{C764DE79-268F-4C1A-8933-263129D2AF90}" type="datetimeFigureOut">
               <a:rPr lang="en-US" dirty="0"/>
-              <a:t>3/1/20</a:t>
+              <a:t>3/4/20</a:t>
             </a:fld>
             <a:endParaRPr lang="en-US" dirty="0"/>
           </a:p>
@@ -2028,7 +2028,7 @@
           <a:p>
             <a:fld id="{C764DE79-268F-4C1A-8933-263129D2AF90}" type="datetimeFigureOut">
               <a:rPr lang="en-US" dirty="0"/>
-              <a:t>3/1/20</a:t>
+              <a:t>3/4/20</a:t>
             </a:fld>
             <a:endParaRPr lang="en-US" dirty="0"/>
           </a:p>
@@ -2255,7 +2255,7 @@
           <a:p>
             <a:fld id="{C764DE79-268F-4C1A-8933-263129D2AF90}" type="datetimeFigureOut">
               <a:rPr lang="en-US" dirty="0"/>
-              <a:t>3/1/20</a:t>
+              <a:t>3/4/20</a:t>
             </a:fld>
             <a:endParaRPr lang="en-US" dirty="0"/>
           </a:p>
@@ -2617,7 +2617,7 @@
           <a:p>
             <a:fld id="{C764DE79-268F-4C1A-8933-263129D2AF90}" type="datetimeFigureOut">
               <a:rPr lang="en-US" dirty="0"/>
-              <a:t>3/1/20</a:t>
+              <a:t>3/4/20</a:t>
             </a:fld>
             <a:endParaRPr lang="en-US" dirty="0"/>
           </a:p>
@@ -2730,7 +2730,7 @@
           <a:p>
             <a:fld id="{C764DE79-268F-4C1A-8933-263129D2AF90}" type="datetimeFigureOut">
               <a:rPr lang="en-US" dirty="0"/>
-              <a:t>3/1/20</a:t>
+              <a:t>3/4/20</a:t>
             </a:fld>
             <a:endParaRPr lang="en-US" dirty="0"/>
           </a:p>
@@ -2820,7 +2820,7 @@
           <a:p>
             <a:fld id="{C764DE79-268F-4C1A-8933-263129D2AF90}" type="datetimeFigureOut">
               <a:rPr lang="en-US" dirty="0"/>
-              <a:t>3/1/20</a:t>
+              <a:t>3/4/20</a:t>
             </a:fld>
             <a:endParaRPr lang="en-US" dirty="0"/>
           </a:p>
@@ -3092,7 +3092,7 @@
           <a:p>
             <a:fld id="{C764DE79-268F-4C1A-8933-263129D2AF90}" type="datetimeFigureOut">
               <a:rPr lang="en-US" dirty="0"/>
-              <a:t>3/1/20</a:t>
+              <a:t>3/4/20</a:t>
             </a:fld>
             <a:endParaRPr lang="en-US" dirty="0"/>
           </a:p>
@@ -3344,7 +3344,7 @@
           <a:p>
             <a:fld id="{C764DE79-268F-4C1A-8933-263129D2AF90}" type="datetimeFigureOut">
               <a:rPr lang="en-US" dirty="0"/>
-              <a:t>3/1/20</a:t>
+              <a:t>3/4/20</a:t>
             </a:fld>
             <a:endParaRPr lang="en-US" dirty="0"/>
           </a:p>
@@ -3552,7 +3552,7 @@
           <a:p>
             <a:fld id="{C764DE79-268F-4C1A-8933-263129D2AF90}" type="datetimeFigureOut">
               <a:rPr lang="en-US" dirty="0"/>
-              <a:t>3/1/20</a:t>
+              <a:t>3/4/20</a:t>
             </a:fld>
             <a:endParaRPr lang="en-US" dirty="0"/>
           </a:p>
@@ -3998,7 +3998,7 @@
           <a:p>
             <a:r>
               <a:rPr lang="en-US" dirty="0"/>
-              <a:t>Feb 28, 2019</a:t>
+              <a:t>March 4, 2020</a:t>
             </a:r>
           </a:p>
         </p:txBody>

</xml_diff>